<commit_message>
adding download file locations from GISAID and NCBI in readme
</commit_message>
<xml_diff>
--- a/seq_upload_flowchart.pptx
+++ b/seq_upload_flowchart.pptx
@@ -107,6 +107,11 @@
       </a:defRPr>
     </a:lvl9pPr>
   </p:defaultTextStyle>
+  <p:extLst>
+    <p:ext uri="{EFAFB233-063F-42B5-8137-9DF3F51BA10A}">
+      <p15:sldGuideLst xmlns:p15="http://schemas.microsoft.com/office/powerpoint/2012/main"/>
+    </p:ext>
+  </p:extLst>
 </p:presentation>
 </file>
 
@@ -192,7 +197,7 @@
           <a:p>
             <a:fld id="{087E16BA-9989-A04D-B997-6FDD6793C978}" type="datetimeFigureOut">
               <a:rPr lang="en-US" smtClean="0"/>
-              <a:t>9/3/21</a:t>
+              <a:t>9/25/21</a:t>
             </a:fld>
             <a:endParaRPr lang="en-US"/>
           </a:p>
@@ -690,7 +695,7 @@
           <a:p>
             <a:fld id="{82C1B376-0814-BB45-BD6C-075699BD4AFF}" type="datetimeFigureOut">
               <a:rPr lang="en-US" smtClean="0"/>
-              <a:t>9/3/21</a:t>
+              <a:t>9/25/21</a:t>
             </a:fld>
             <a:endParaRPr lang="en-US"/>
           </a:p>
@@ -888,7 +893,7 @@
           <a:p>
             <a:fld id="{82C1B376-0814-BB45-BD6C-075699BD4AFF}" type="datetimeFigureOut">
               <a:rPr lang="en-US" smtClean="0"/>
-              <a:t>9/3/21</a:t>
+              <a:t>9/25/21</a:t>
             </a:fld>
             <a:endParaRPr lang="en-US"/>
           </a:p>
@@ -1096,7 +1101,7 @@
           <a:p>
             <a:fld id="{82C1B376-0814-BB45-BD6C-075699BD4AFF}" type="datetimeFigureOut">
               <a:rPr lang="en-US" smtClean="0"/>
-              <a:t>9/3/21</a:t>
+              <a:t>9/25/21</a:t>
             </a:fld>
             <a:endParaRPr lang="en-US"/>
           </a:p>
@@ -1294,7 +1299,7 @@
           <a:p>
             <a:fld id="{82C1B376-0814-BB45-BD6C-075699BD4AFF}" type="datetimeFigureOut">
               <a:rPr lang="en-US" smtClean="0"/>
-              <a:t>9/3/21</a:t>
+              <a:t>9/25/21</a:t>
             </a:fld>
             <a:endParaRPr lang="en-US"/>
           </a:p>
@@ -1569,7 +1574,7 @@
           <a:p>
             <a:fld id="{82C1B376-0814-BB45-BD6C-075699BD4AFF}" type="datetimeFigureOut">
               <a:rPr lang="en-US" smtClean="0"/>
-              <a:t>9/3/21</a:t>
+              <a:t>9/25/21</a:t>
             </a:fld>
             <a:endParaRPr lang="en-US"/>
           </a:p>
@@ -1834,7 +1839,7 @@
           <a:p>
             <a:fld id="{82C1B376-0814-BB45-BD6C-075699BD4AFF}" type="datetimeFigureOut">
               <a:rPr lang="en-US" smtClean="0"/>
-              <a:t>9/3/21</a:t>
+              <a:t>9/25/21</a:t>
             </a:fld>
             <a:endParaRPr lang="en-US"/>
           </a:p>
@@ -2246,7 +2251,7 @@
           <a:p>
             <a:fld id="{82C1B376-0814-BB45-BD6C-075699BD4AFF}" type="datetimeFigureOut">
               <a:rPr lang="en-US" smtClean="0"/>
-              <a:t>9/3/21</a:t>
+              <a:t>9/25/21</a:t>
             </a:fld>
             <a:endParaRPr lang="en-US"/>
           </a:p>
@@ -2387,7 +2392,7 @@
           <a:p>
             <a:fld id="{82C1B376-0814-BB45-BD6C-075699BD4AFF}" type="datetimeFigureOut">
               <a:rPr lang="en-US" smtClean="0"/>
-              <a:t>9/3/21</a:t>
+              <a:t>9/25/21</a:t>
             </a:fld>
             <a:endParaRPr lang="en-US"/>
           </a:p>
@@ -2500,7 +2505,7 @@
           <a:p>
             <a:fld id="{82C1B376-0814-BB45-BD6C-075699BD4AFF}" type="datetimeFigureOut">
               <a:rPr lang="en-US" smtClean="0"/>
-              <a:t>9/3/21</a:t>
+              <a:t>9/25/21</a:t>
             </a:fld>
             <a:endParaRPr lang="en-US"/>
           </a:p>
@@ -2811,7 +2816,7 @@
           <a:p>
             <a:fld id="{82C1B376-0814-BB45-BD6C-075699BD4AFF}" type="datetimeFigureOut">
               <a:rPr lang="en-US" smtClean="0"/>
-              <a:t>9/3/21</a:t>
+              <a:t>9/25/21</a:t>
             </a:fld>
             <a:endParaRPr lang="en-US"/>
           </a:p>
@@ -3099,7 +3104,7 @@
           <a:p>
             <a:fld id="{82C1B376-0814-BB45-BD6C-075699BD4AFF}" type="datetimeFigureOut">
               <a:rPr lang="en-US" smtClean="0"/>
-              <a:t>9/3/21</a:t>
+              <a:t>9/25/21</a:t>
             </a:fld>
             <a:endParaRPr lang="en-US"/>
           </a:p>
@@ -3340,7 +3345,7 @@
           <a:p>
             <a:fld id="{82C1B376-0814-BB45-BD6C-075699BD4AFF}" type="datetimeFigureOut">
               <a:rPr lang="en-US" smtClean="0"/>
-              <a:t>9/3/21</a:t>
+              <a:t>9/25/21</a:t>
             </a:fld>
             <a:endParaRPr lang="en-US"/>
           </a:p>
@@ -3757,51 +3762,6 @@
           <a:chExt cx="0" cy="0"/>
         </a:xfrm>
       </p:grpSpPr>
-      <p:pic>
-        <p:nvPicPr>
-          <p:cNvPr id="58" name="Picture 4" descr="Refresh Symbol HD Stock Images | Shutterstock">
-            <a:extLst>
-              <a:ext uri="{FF2B5EF4-FFF2-40B4-BE49-F238E27FC236}">
-                <a16:creationId xmlns:a16="http://schemas.microsoft.com/office/drawing/2014/main" id="{EE19CBA5-B3B3-214E-857B-1E0166F0623B}"/>
-              </a:ext>
-            </a:extLst>
-          </p:cNvPr>
-          <p:cNvPicPr>
-            <a:picLocks noChangeAspect="1" noChangeArrowheads="1"/>
-          </p:cNvPicPr>
-          <p:nvPr/>
-        </p:nvPicPr>
-        <p:blipFill rotWithShape="1">
-          <a:blip r:embed="rId3">
-            <a:extLst>
-              <a:ext uri="{28A0092B-C50C-407E-A947-70E740481C1C}">
-                <a14:useLocalDpi xmlns:a14="http://schemas.microsoft.com/office/drawing/2010/main" val="0"/>
-              </a:ext>
-            </a:extLst>
-          </a:blip>
-          <a:srcRect l="10878" t="7778" r="10849" b="14014"/>
-          <a:stretch/>
-        </p:blipFill>
-        <p:spPr bwMode="auto">
-          <a:xfrm rot="8191407">
-            <a:off x="1839715" y="2537978"/>
-            <a:ext cx="169959" cy="182880"/>
-          </a:xfrm>
-          <a:prstGeom prst="rect">
-            <a:avLst/>
-          </a:prstGeom>
-          <a:noFill/>
-          <a:extLst>
-            <a:ext uri="{909E8E84-426E-40DD-AFC4-6F175D3DCCD1}">
-              <a14:hiddenFill xmlns:a14="http://schemas.microsoft.com/office/drawing/2010/main">
-                <a:solidFill>
-                  <a:srgbClr val="FFFFFF"/>
-                </a:solidFill>
-              </a14:hiddenFill>
-            </a:ext>
-          </a:extLst>
-        </p:spPr>
-      </p:pic>
       <p:sp>
         <p:nvSpPr>
           <p:cNvPr id="4" name="Rounded Rectangle 3">
@@ -3816,7 +3776,7 @@
         </p:nvSpPr>
         <p:spPr>
           <a:xfrm>
-            <a:off x="152401" y="754192"/>
+            <a:off x="192705" y="564244"/>
             <a:ext cx="1807779" cy="767255"/>
           </a:xfrm>
           <a:prstGeom prst="roundRect">
@@ -3917,7 +3877,7 @@
         </p:nvSpPr>
         <p:spPr>
           <a:xfrm>
-            <a:off x="2097888" y="1021645"/>
+            <a:off x="2138192" y="831697"/>
             <a:ext cx="451945" cy="232349"/>
           </a:xfrm>
           <a:prstGeom prst="rightArrow">
@@ -3977,7 +3937,7 @@
         </p:nvSpPr>
         <p:spPr>
           <a:xfrm>
-            <a:off x="4633028" y="1021645"/>
+            <a:off x="4673332" y="831697"/>
             <a:ext cx="451945" cy="232349"/>
           </a:xfrm>
           <a:prstGeom prst="rightArrow">
@@ -4037,7 +3997,7 @@
         </p:nvSpPr>
         <p:spPr>
           <a:xfrm>
-            <a:off x="5223587" y="754192"/>
+            <a:off x="5263891" y="564244"/>
             <a:ext cx="1807779" cy="767255"/>
           </a:xfrm>
           <a:prstGeom prst="roundRect">
@@ -4072,6 +4032,16 @@
           <a:p>
             <a:pPr algn="ctr"/>
             <a:r>
+              <a:rPr lang="en-US" sz="1400" dirty="0" err="1">
+                <a:solidFill>
+                  <a:schemeClr val="accent1">
+                    <a:lumMod val="50000"/>
+                  </a:schemeClr>
+                </a:solidFill>
+              </a:rPr>
+              <a:t>Concat</a:t>
+            </a:r>
+            <a:r>
               <a:rPr lang="en-US" sz="1400" dirty="0">
                 <a:solidFill>
                   <a:schemeClr val="accent1">
@@ -4079,25 +4049,8 @@
                   </a:schemeClr>
                 </a:solidFill>
               </a:rPr>
-              <a:t>Format seqs + </a:t>
-            </a:r>
-            <a:r>
-              <a:rPr lang="en-US" sz="1400" dirty="0" err="1">
-                <a:solidFill>
-                  <a:schemeClr val="accent1">
-                    <a:lumMod val="50000"/>
-                  </a:schemeClr>
-                </a:solidFill>
-              </a:rPr>
-              <a:t>rename_fasta.py</a:t>
-            </a:r>
-            <a:endParaRPr lang="en-US" sz="1400" dirty="0">
-              <a:solidFill>
-                <a:schemeClr val="accent1">
-                  <a:lumMod val="50000"/>
-                </a:schemeClr>
-              </a:solidFill>
-            </a:endParaRPr>
+              <a:t> and subset seqs (coverage etc.)</a:t>
+            </a:r>
           </a:p>
         </p:txBody>
       </p:sp>
@@ -4115,7 +4068,7 @@
         </p:nvSpPr>
         <p:spPr>
           <a:xfrm>
-            <a:off x="10244589" y="2426517"/>
+            <a:off x="10284893" y="2236569"/>
             <a:ext cx="1807779" cy="767255"/>
           </a:xfrm>
           <a:prstGeom prst="roundRect">
@@ -4176,7 +4129,7 @@
         </p:nvSpPr>
         <p:spPr>
           <a:xfrm>
-            <a:off x="7759633" y="754192"/>
+            <a:off x="7799937" y="564244"/>
             <a:ext cx="1807779" cy="767255"/>
           </a:xfrm>
           <a:prstGeom prst="roundRect">
@@ -4237,7 +4190,7 @@
         </p:nvSpPr>
         <p:spPr>
           <a:xfrm>
-            <a:off x="10244589" y="769074"/>
+            <a:off x="10284893" y="579126"/>
             <a:ext cx="1807779" cy="767255"/>
           </a:xfrm>
           <a:prstGeom prst="roundRect">
@@ -4298,7 +4251,7 @@
         </p:nvSpPr>
         <p:spPr>
           <a:xfrm>
-            <a:off x="7759633" y="2421536"/>
+            <a:off x="7799937" y="2231588"/>
             <a:ext cx="1807779" cy="767255"/>
           </a:xfrm>
           <a:prstGeom prst="roundRect">
@@ -4359,7 +4312,7 @@
         </p:nvSpPr>
         <p:spPr>
           <a:xfrm>
-            <a:off x="5244660" y="2421536"/>
+            <a:off x="5284964" y="2231588"/>
             <a:ext cx="1807779" cy="767255"/>
           </a:xfrm>
           <a:prstGeom prst="roundRect">
@@ -4440,7 +4393,7 @@
         </p:nvSpPr>
         <p:spPr>
           <a:xfrm>
-            <a:off x="2698441" y="1990829"/>
+            <a:off x="2727845" y="1807446"/>
             <a:ext cx="1807779" cy="767255"/>
           </a:xfrm>
           <a:prstGeom prst="roundRect">
@@ -4501,7 +4454,7 @@
         </p:nvSpPr>
         <p:spPr>
           <a:xfrm>
-            <a:off x="2698440" y="2861767"/>
+            <a:off x="2727844" y="2678384"/>
             <a:ext cx="1807779" cy="767255"/>
           </a:xfrm>
           <a:prstGeom prst="roundRect">
@@ -4579,7 +4532,7 @@
         </p:nvSpPr>
         <p:spPr>
           <a:xfrm>
-            <a:off x="243208" y="1999126"/>
+            <a:off x="192704" y="1813771"/>
             <a:ext cx="1807779" cy="767255"/>
           </a:xfrm>
           <a:prstGeom prst="roundRect">
@@ -4640,7 +4593,7 @@
         </p:nvSpPr>
         <p:spPr>
           <a:xfrm>
-            <a:off x="241498" y="2861768"/>
+            <a:off x="190994" y="2676413"/>
             <a:ext cx="1807779" cy="767255"/>
           </a:xfrm>
           <a:prstGeom prst="roundRect">
@@ -4718,7 +4671,7 @@
         </p:nvSpPr>
         <p:spPr>
           <a:xfrm>
-            <a:off x="243545" y="4445773"/>
+            <a:off x="190994" y="4329112"/>
             <a:ext cx="1807779" cy="767255"/>
           </a:xfrm>
           <a:prstGeom prst="roundRect">
@@ -4779,7 +4732,7 @@
         </p:nvSpPr>
         <p:spPr>
           <a:xfrm>
-            <a:off x="2787718" y="4445773"/>
+            <a:off x="2724226" y="4329111"/>
             <a:ext cx="1807779" cy="767255"/>
           </a:xfrm>
           <a:prstGeom prst="roundRect">
@@ -4857,7 +4810,7 @@
         </p:nvSpPr>
         <p:spPr>
           <a:xfrm>
-            <a:off x="5302691" y="4437294"/>
+            <a:off x="5284964" y="4291726"/>
             <a:ext cx="1807779" cy="767255"/>
           </a:xfrm>
           <a:prstGeom prst="roundRect">
@@ -4938,7 +4891,7 @@
         </p:nvSpPr>
         <p:spPr>
           <a:xfrm>
-            <a:off x="10244589" y="4445862"/>
+            <a:off x="10284893" y="4291726"/>
             <a:ext cx="1807779" cy="767255"/>
           </a:xfrm>
           <a:prstGeom prst="roundRect">
@@ -4999,7 +4952,7 @@
         </p:nvSpPr>
         <p:spPr>
           <a:xfrm>
-            <a:off x="10244589" y="5929793"/>
+            <a:off x="10284893" y="5775657"/>
             <a:ext cx="1807779" cy="767255"/>
           </a:xfrm>
           <a:prstGeom prst="roundRect">
@@ -5060,7 +5013,7 @@
         </p:nvSpPr>
         <p:spPr>
           <a:xfrm>
-            <a:off x="7787646" y="5929793"/>
+            <a:off x="7827950" y="5775657"/>
             <a:ext cx="1807779" cy="767255"/>
           </a:xfrm>
           <a:prstGeom prst="roundRect">
@@ -5141,7 +5094,7 @@
         </p:nvGrpSpPr>
         <p:grpSpPr>
           <a:xfrm>
-            <a:off x="2687541" y="754192"/>
+            <a:off x="2727845" y="564244"/>
             <a:ext cx="1807779" cy="767255"/>
             <a:chOff x="3226676" y="459914"/>
             <a:chExt cx="1807779" cy="767255"/>
@@ -5240,7 +5193,7 @@
             <p:nvPr/>
           </p:nvPicPr>
           <p:blipFill>
-            <a:blip r:embed="rId4">
+            <a:blip r:embed="rId3">
               <a:extLst>
                 <a:ext uri="{28A0092B-C50C-407E-A947-70E740481C1C}">
                   <a14:useLocalDpi xmlns:a14="http://schemas.microsoft.com/office/drawing/2010/main" val="0"/>
@@ -5290,7 +5243,7 @@
         </p:nvSpPr>
         <p:spPr>
           <a:xfrm>
-            <a:off x="7169980" y="1021645"/>
+            <a:off x="7210284" y="831697"/>
             <a:ext cx="451945" cy="232349"/>
           </a:xfrm>
           <a:prstGeom prst="rightArrow">
@@ -5350,7 +5303,7 @@
         </p:nvSpPr>
         <p:spPr>
           <a:xfrm>
-            <a:off x="9680028" y="1021645"/>
+            <a:off x="9720332" y="831697"/>
             <a:ext cx="451945" cy="232349"/>
           </a:xfrm>
           <a:prstGeom prst="rightArrow">
@@ -5410,7 +5363,7 @@
         </p:nvSpPr>
         <p:spPr>
           <a:xfrm rot="5400000">
-            <a:off x="10922507" y="1865248"/>
+            <a:off x="10962811" y="1675300"/>
             <a:ext cx="451945" cy="232349"/>
           </a:xfrm>
           <a:prstGeom prst="rightArrow">
@@ -5470,7 +5423,7 @@
         </p:nvSpPr>
         <p:spPr>
           <a:xfrm rot="10800000">
-            <a:off x="9680028" y="2630235"/>
+            <a:off x="9720332" y="2440287"/>
             <a:ext cx="451945" cy="232349"/>
           </a:xfrm>
           <a:prstGeom prst="rightArrow">
@@ -5530,7 +5483,7 @@
         </p:nvSpPr>
         <p:spPr>
           <a:xfrm rot="10800000">
-            <a:off x="7169980" y="2688988"/>
+            <a:off x="7210284" y="2499040"/>
             <a:ext cx="451945" cy="232349"/>
           </a:xfrm>
           <a:prstGeom prst="rightArrow">
@@ -5590,7 +5543,7 @@
         </p:nvSpPr>
         <p:spPr>
           <a:xfrm rot="10800000">
-            <a:off x="4653177" y="2695196"/>
+            <a:off x="4693481" y="2505248"/>
             <a:ext cx="451945" cy="232349"/>
           </a:xfrm>
           <a:prstGeom prst="rightArrow">
@@ -5650,7 +5603,7 @@
         </p:nvSpPr>
         <p:spPr>
           <a:xfrm>
-            <a:off x="2285447" y="2358190"/>
+            <a:off x="2231308" y="2088538"/>
             <a:ext cx="300377" cy="1003379"/>
           </a:xfrm>
           <a:prstGeom prst="leftBrace">
@@ -5700,7 +5653,7 @@
         </p:nvSpPr>
         <p:spPr>
           <a:xfrm>
-            <a:off x="2193773" y="4656925"/>
+            <a:off x="2141222" y="4528959"/>
             <a:ext cx="451945" cy="232349"/>
           </a:xfrm>
           <a:prstGeom prst="rightArrow">
@@ -5760,7 +5713,7 @@
         </p:nvSpPr>
         <p:spPr>
           <a:xfrm>
-            <a:off x="4730725" y="4656925"/>
+            <a:off x="4678174" y="4528959"/>
             <a:ext cx="451945" cy="232349"/>
           </a:xfrm>
           <a:prstGeom prst="rightArrow">
@@ -5821,7 +5774,7 @@
           <p:nvPr/>
         </p:nvPicPr>
         <p:blipFill>
-          <a:blip r:embed="rId4">
+          <a:blip r:embed="rId3">
             <a:extLst>
               <a:ext uri="{28A0092B-C50C-407E-A947-70E740481C1C}">
                 <a14:useLocalDpi xmlns:a14="http://schemas.microsoft.com/office/drawing/2010/main" val="0"/>
@@ -5835,7 +5788,7 @@
         </p:blipFill>
         <p:spPr bwMode="auto">
           <a:xfrm>
-            <a:off x="1635878" y="4895858"/>
+            <a:off x="1583327" y="4767892"/>
             <a:ext cx="235527" cy="182880"/>
           </a:xfrm>
           <a:prstGeom prst="rect">
@@ -5867,7 +5820,7 @@
         </p:nvGrpSpPr>
         <p:grpSpPr>
           <a:xfrm>
-            <a:off x="7787646" y="4419692"/>
+            <a:off x="7799937" y="4291726"/>
             <a:ext cx="1807779" cy="767255"/>
             <a:chOff x="8487755" y="4612172"/>
             <a:chExt cx="1807779" cy="767255"/>
@@ -5949,7 +5902,7 @@
             <p:nvPr/>
           </p:nvPicPr>
           <p:blipFill>
-            <a:blip r:embed="rId4">
+            <a:blip r:embed="rId3">
               <a:extLst>
                 <a:ext uri="{28A0092B-C50C-407E-A947-70E740481C1C}">
                   <a14:useLocalDpi xmlns:a14="http://schemas.microsoft.com/office/drawing/2010/main" val="0"/>
@@ -5999,7 +5952,7 @@
         </p:nvSpPr>
         <p:spPr>
           <a:xfrm>
-            <a:off x="7230491" y="4729227"/>
+            <a:off x="7210284" y="4596563"/>
             <a:ext cx="451945" cy="232349"/>
           </a:xfrm>
           <a:prstGeom prst="rightArrow">
@@ -6060,7 +6013,7 @@
           <p:nvPr/>
         </p:nvPicPr>
         <p:blipFill>
-          <a:blip r:embed="rId4">
+          <a:blip r:embed="rId3">
             <a:extLst>
               <a:ext uri="{28A0092B-C50C-407E-A947-70E740481C1C}">
                 <a14:useLocalDpi xmlns:a14="http://schemas.microsoft.com/office/drawing/2010/main" val="0"/>
@@ -6074,7 +6027,7 @@
         </p:blipFill>
         <p:spPr bwMode="auto">
           <a:xfrm>
-            <a:off x="9301867" y="6454465"/>
+            <a:off x="9249316" y="6326499"/>
             <a:ext cx="235527" cy="182880"/>
           </a:xfrm>
           <a:prstGeom prst="rect">
@@ -6106,7 +6059,7 @@
         </p:nvSpPr>
         <p:spPr>
           <a:xfrm rot="10800000">
-            <a:off x="9662342" y="6197245"/>
+            <a:off x="9702646" y="6043109"/>
             <a:ext cx="451945" cy="232349"/>
           </a:xfrm>
           <a:prstGeom prst="rightArrow">
@@ -6152,6 +6105,51 @@
           </a:p>
         </p:txBody>
       </p:sp>
+      <p:pic>
+        <p:nvPicPr>
+          <p:cNvPr id="58" name="Picture 4" descr="Refresh Symbol HD Stock Images | Shutterstock">
+            <a:extLst>
+              <a:ext uri="{FF2B5EF4-FFF2-40B4-BE49-F238E27FC236}">
+                <a16:creationId xmlns:a16="http://schemas.microsoft.com/office/drawing/2014/main" id="{EE19CBA5-B3B3-214E-857B-1E0166F0623B}"/>
+              </a:ext>
+            </a:extLst>
+          </p:cNvPr>
+          <p:cNvPicPr>
+            <a:picLocks noChangeAspect="1" noChangeArrowheads="1"/>
+          </p:cNvPicPr>
+          <p:nvPr/>
+        </p:nvPicPr>
+        <p:blipFill rotWithShape="1">
+          <a:blip r:embed="rId4">
+            <a:extLst>
+              <a:ext uri="{28A0092B-C50C-407E-A947-70E740481C1C}">
+                <a14:useLocalDpi xmlns:a14="http://schemas.microsoft.com/office/drawing/2010/main" val="0"/>
+              </a:ext>
+            </a:extLst>
+          </a:blip>
+          <a:srcRect l="10878" t="7778" r="10849" b="14014"/>
+          <a:stretch/>
+        </p:blipFill>
+        <p:spPr bwMode="auto">
+          <a:xfrm rot="8191407">
+            <a:off x="1789211" y="2352623"/>
+            <a:ext cx="169959" cy="182880"/>
+          </a:xfrm>
+          <a:prstGeom prst="rect">
+            <a:avLst/>
+          </a:prstGeom>
+          <a:noFill/>
+          <a:extLst>
+            <a:ext uri="{909E8E84-426E-40DD-AFC4-6F175D3DCCD1}">
+              <a14:hiddenFill xmlns:a14="http://schemas.microsoft.com/office/drawing/2010/main">
+                <a:solidFill>
+                  <a:srgbClr val="FFFFFF"/>
+                </a:solidFill>
+              </a14:hiddenFill>
+            </a:ext>
+          </a:extLst>
+        </p:spPr>
+      </p:pic>
       <p:sp>
         <p:nvSpPr>
           <p:cNvPr id="59" name="Right Arrow 58">
@@ -6166,7 +6164,7 @@
         </p:nvSpPr>
         <p:spPr>
           <a:xfrm rot="5400000">
-            <a:off x="924911" y="3923151"/>
+            <a:off x="872360" y="3795185"/>
             <a:ext cx="451945" cy="232349"/>
           </a:xfrm>
           <a:prstGeom prst="rightArrow">
@@ -6226,7 +6224,7 @@
         </p:nvSpPr>
         <p:spPr>
           <a:xfrm>
-            <a:off x="9700635" y="4713225"/>
+            <a:off x="9720332" y="4584302"/>
             <a:ext cx="451945" cy="232349"/>
           </a:xfrm>
           <a:prstGeom prst="rightArrow">
@@ -6287,7 +6285,7 @@
           <p:nvPr/>
         </p:nvPicPr>
         <p:blipFill rotWithShape="1">
-          <a:blip r:embed="rId3">
+          <a:blip r:embed="rId4">
             <a:extLst>
               <a:ext uri="{28A0092B-C50C-407E-A947-70E740481C1C}">
                 <a14:useLocalDpi xmlns:a14="http://schemas.microsoft.com/office/drawing/2010/main" val="0"/>
@@ -6299,7 +6297,7 @@
         </p:blipFill>
         <p:spPr bwMode="auto">
           <a:xfrm rot="8191407">
-            <a:off x="11750279" y="6392578"/>
+            <a:off x="11697728" y="6264612"/>
             <a:ext cx="169959" cy="182880"/>
           </a:xfrm>
           <a:prstGeom prst="rect">
@@ -6331,7 +6329,7 @@
         </p:nvSpPr>
         <p:spPr>
           <a:xfrm rot="5400000">
-            <a:off x="10922508" y="5452438"/>
+            <a:off x="10962812" y="5298302"/>
             <a:ext cx="451945" cy="232349"/>
           </a:xfrm>
           <a:prstGeom prst="rightArrow">
@@ -6392,7 +6390,7 @@
           <p:nvPr/>
         </p:nvPicPr>
         <p:blipFill>
-          <a:blip r:embed="rId4">
+          <a:blip r:embed="rId3">
             <a:extLst>
               <a:ext uri="{28A0092B-C50C-407E-A947-70E740481C1C}">
                 <a14:useLocalDpi xmlns:a14="http://schemas.microsoft.com/office/drawing/2010/main" val="0"/>
@@ -6406,7 +6404,7 @@
         </p:blipFill>
         <p:spPr bwMode="auto">
           <a:xfrm>
-            <a:off x="815519" y="5854525"/>
+            <a:off x="762968" y="5726559"/>
             <a:ext cx="353291" cy="274320"/>
           </a:xfrm>
           <a:prstGeom prst="rect">
@@ -6438,7 +6436,7 @@
         </p:nvSpPr>
         <p:spPr>
           <a:xfrm>
-            <a:off x="1242434" y="5844413"/>
+            <a:off x="1189883" y="5716447"/>
             <a:ext cx="3828677" cy="307777"/>
           </a:xfrm>
           <a:prstGeom prst="rect">
@@ -6484,7 +6482,7 @@
           <p:nvPr/>
         </p:nvPicPr>
         <p:blipFill rotWithShape="1">
-          <a:blip r:embed="rId3">
+          <a:blip r:embed="rId4">
             <a:extLst>
               <a:ext uri="{28A0092B-C50C-407E-A947-70E740481C1C}">
                 <a14:useLocalDpi xmlns:a14="http://schemas.microsoft.com/office/drawing/2010/main" val="0"/>
@@ -6496,7 +6494,7 @@
         </p:blipFill>
         <p:spPr bwMode="auto">
           <a:xfrm rot="8191407">
-            <a:off x="874923" y="6227465"/>
+            <a:off x="822372" y="6099499"/>
             <a:ext cx="254939" cy="274320"/>
           </a:xfrm>
           <a:prstGeom prst="rect">
@@ -6528,7 +6526,7 @@
         </p:nvSpPr>
         <p:spPr>
           <a:xfrm>
-            <a:off x="1242434" y="6193073"/>
+            <a:off x="1189883" y="6065107"/>
             <a:ext cx="2248244" cy="307777"/>
           </a:xfrm>
           <a:prstGeom prst="rect">
@@ -6545,41 +6543,6 @@
             <a:r>
               <a:rPr lang="en-US" sz="1400" dirty="0"/>
               <a:t>Back and forth with curators</a:t>
-            </a:r>
-          </a:p>
-        </p:txBody>
-      </p:sp>
-      <p:sp>
-        <p:nvSpPr>
-          <p:cNvPr id="50" name="TextBox 49">
-            <a:extLst>
-              <a:ext uri="{FF2B5EF4-FFF2-40B4-BE49-F238E27FC236}">
-                <a16:creationId xmlns:a16="http://schemas.microsoft.com/office/drawing/2014/main" id="{63C4A087-B9FC-384B-86C9-EE5860FD17CF}"/>
-              </a:ext>
-            </a:extLst>
-          </p:cNvPr>
-          <p:cNvSpPr txBox="1"/>
-          <p:nvPr/>
-        </p:nvSpPr>
-        <p:spPr>
-          <a:xfrm>
-            <a:off x="2799905" y="84639"/>
-            <a:ext cx="6592189" cy="430887"/>
-          </a:xfrm>
-          <a:prstGeom prst="rect">
-            <a:avLst/>
-          </a:prstGeom>
-          <a:noFill/>
-        </p:spPr>
-        <p:txBody>
-          <a:bodyPr wrap="none" rtlCol="0">
-            <a:spAutoFit/>
-          </a:bodyPr>
-          <a:lstStyle/>
-          <a:p>
-            <a:r>
-              <a:rPr lang="en-US" sz="2200" b="1" u="sng" dirty="0"/>
-              <a:t>High level overview: SARS-CoV-2 sequence submission </a:t>
             </a:r>
           </a:p>
         </p:txBody>

</xml_diff>